<commit_message>
Minor formatting change to slide deck.
</commit_message>
<xml_diff>
--- a/Presentation/Project_3_COVID19_MLModels_LabTests_Presentation.pptx
+++ b/Presentation/Project_3_COVID19_MLModels_LabTests_Presentation.pptx
@@ -138,6 +138,14 @@
 </p:presentation>
 </file>
 
+<file path=ppt/revisionInfo.xml><?xml version="1.0" encoding="utf-8"?>
+<p1510:revInfo xmlns:a="http://schemas.openxmlformats.org/drawingml/2006/main" xmlns:r="http://schemas.openxmlformats.org/officeDocument/2006/relationships" xmlns:p1510="http://schemas.microsoft.com/office/powerpoint/2015/10/main">
+  <p1510:revLst>
+    <p1510:client id="{F9D15FEA-7F7B-7040-AA7D-857C53A1B0AC}" v="2" dt="2020-05-12T01:02:25.877"/>
+  </p1510:revLst>
+</p1510:revInfo>
+</file>
+
 <file path=ppt/changesInfos/changesInfo1.xml><?xml version="1.0" encoding="utf-8"?>
 <pc:chgInfo xmlns:a="http://schemas.openxmlformats.org/drawingml/2006/main" xmlns:r="http://schemas.openxmlformats.org/officeDocument/2006/relationships" xmlns:ac="http://schemas.microsoft.com/office/drawing/2013/main/command" xmlns:pc="http://schemas.microsoft.com/office/powerpoint/2013/main/command">
   <pc:docChgLst>
@@ -2463,6 +2471,30 @@
           </pc:sldLayoutMkLst>
         </pc:sldLayoutChg>
       </pc:sldMasterChg>
+    </pc:docChg>
+  </pc:docChgLst>
+  <pc:docChgLst>
+    <pc:chgData name="Alexis Perumal" userId="6bacb2ee70178176" providerId="LiveId" clId="{F9D15FEA-7F7B-7040-AA7D-857C53A1B0AC}"/>
+    <pc:docChg chg="modSld">
+      <pc:chgData name="Alexis Perumal" userId="6bacb2ee70178176" providerId="LiveId" clId="{F9D15FEA-7F7B-7040-AA7D-857C53A1B0AC}" dt="2020-05-12T01:02:28.067" v="4" actId="20577"/>
+      <pc:docMkLst>
+        <pc:docMk/>
+      </pc:docMkLst>
+      <pc:sldChg chg="modSp">
+        <pc:chgData name="Alexis Perumal" userId="6bacb2ee70178176" providerId="LiveId" clId="{F9D15FEA-7F7B-7040-AA7D-857C53A1B0AC}" dt="2020-05-12T01:02:28.067" v="4" actId="20577"/>
+        <pc:sldMkLst>
+          <pc:docMk/>
+          <pc:sldMk cId="2251627920" sldId="338"/>
+        </pc:sldMkLst>
+        <pc:spChg chg="mod">
+          <ac:chgData name="Alexis Perumal" userId="6bacb2ee70178176" providerId="LiveId" clId="{F9D15FEA-7F7B-7040-AA7D-857C53A1B0AC}" dt="2020-05-12T01:02:28.067" v="4" actId="20577"/>
+          <ac:spMkLst>
+            <pc:docMk/>
+            <pc:sldMk cId="2251627920" sldId="338"/>
+            <ac:spMk id="3" creationId="{F1BCC93D-A4C2-004B-A0BA-4F8EB4392747}"/>
+          </ac:spMkLst>
+        </pc:spChg>
+      </pc:sldChg>
     </pc:docChg>
   </pc:docChgLst>
   <pc:docChgLst>
@@ -12778,12 +12810,6 @@
           <a:p>
             <a:r>
               <a:rPr lang="en-US" sz="2000" dirty="0"/>
-              <a:t>Alexis Perumal</a:t>
-            </a:r>
-          </a:p>
-          <a:p>
-            <a:r>
-              <a:rPr lang="en-US" sz="2000" dirty="0"/>
               <a:t>Arundhati Chakraborty</a:t>
             </a:r>
           </a:p>
@@ -12802,6 +12828,12 @@
             <a:r>
               <a:rPr lang="en-US" sz="2000" dirty="0"/>
               <a:t>Grant Thompson</a:t>
+            </a:r>
+          </a:p>
+          <a:p>
+            <a:r>
+              <a:rPr lang="en-US" sz="2000"/>
+              <a:t>Alexis Perumal</a:t>
             </a:r>
           </a:p>
         </p:txBody>

</xml_diff>